<commit_message>
Add project presentation file
</commit_message>
<xml_diff>
--- a/presentation.pptx
+++ b/presentation.pptx
@@ -267,7 +267,7 @@
           <a:p>
             <a:fld id="{379314A1-82A5-4FD9-96C3-56E3E0F9E470}" type="datetimeFigureOut">
               <a:rPr lang="ru-RU" smtClean="0"/>
-              <a:t>24.04.2021</a:t>
+              <a:t>27.04.2021</a:t>
             </a:fld>
             <a:endParaRPr lang="ru-RU"/>
           </a:p>
@@ -465,7 +465,7 @@
           <a:p>
             <a:fld id="{379314A1-82A5-4FD9-96C3-56E3E0F9E470}" type="datetimeFigureOut">
               <a:rPr lang="ru-RU" smtClean="0"/>
-              <a:t>24.04.2021</a:t>
+              <a:t>27.04.2021</a:t>
             </a:fld>
             <a:endParaRPr lang="ru-RU"/>
           </a:p>
@@ -673,7 +673,7 @@
           <a:p>
             <a:fld id="{379314A1-82A5-4FD9-96C3-56E3E0F9E470}" type="datetimeFigureOut">
               <a:rPr lang="ru-RU" smtClean="0"/>
-              <a:t>24.04.2021</a:t>
+              <a:t>27.04.2021</a:t>
             </a:fld>
             <a:endParaRPr lang="ru-RU"/>
           </a:p>
@@ -871,7 +871,7 @@
           <a:p>
             <a:fld id="{379314A1-82A5-4FD9-96C3-56E3E0F9E470}" type="datetimeFigureOut">
               <a:rPr lang="ru-RU" smtClean="0"/>
-              <a:t>24.04.2021</a:t>
+              <a:t>27.04.2021</a:t>
             </a:fld>
             <a:endParaRPr lang="ru-RU"/>
           </a:p>
@@ -1146,7 +1146,7 @@
           <a:p>
             <a:fld id="{379314A1-82A5-4FD9-96C3-56E3E0F9E470}" type="datetimeFigureOut">
               <a:rPr lang="ru-RU" smtClean="0"/>
-              <a:t>24.04.2021</a:t>
+              <a:t>27.04.2021</a:t>
             </a:fld>
             <a:endParaRPr lang="ru-RU"/>
           </a:p>
@@ -1411,7 +1411,7 @@
           <a:p>
             <a:fld id="{379314A1-82A5-4FD9-96C3-56E3E0F9E470}" type="datetimeFigureOut">
               <a:rPr lang="ru-RU" smtClean="0"/>
-              <a:t>24.04.2021</a:t>
+              <a:t>27.04.2021</a:t>
             </a:fld>
             <a:endParaRPr lang="ru-RU"/>
           </a:p>
@@ -1823,7 +1823,7 @@
           <a:p>
             <a:fld id="{379314A1-82A5-4FD9-96C3-56E3E0F9E470}" type="datetimeFigureOut">
               <a:rPr lang="ru-RU" smtClean="0"/>
-              <a:t>24.04.2021</a:t>
+              <a:t>27.04.2021</a:t>
             </a:fld>
             <a:endParaRPr lang="ru-RU"/>
           </a:p>
@@ -1964,7 +1964,7 @@
           <a:p>
             <a:fld id="{379314A1-82A5-4FD9-96C3-56E3E0F9E470}" type="datetimeFigureOut">
               <a:rPr lang="ru-RU" smtClean="0"/>
-              <a:t>24.04.2021</a:t>
+              <a:t>27.04.2021</a:t>
             </a:fld>
             <a:endParaRPr lang="ru-RU"/>
           </a:p>
@@ -2077,7 +2077,7 @@
           <a:p>
             <a:fld id="{379314A1-82A5-4FD9-96C3-56E3E0F9E470}" type="datetimeFigureOut">
               <a:rPr lang="ru-RU" smtClean="0"/>
-              <a:t>24.04.2021</a:t>
+              <a:t>27.04.2021</a:t>
             </a:fld>
             <a:endParaRPr lang="ru-RU"/>
           </a:p>
@@ -2388,7 +2388,7 @@
           <a:p>
             <a:fld id="{379314A1-82A5-4FD9-96C3-56E3E0F9E470}" type="datetimeFigureOut">
               <a:rPr lang="ru-RU" smtClean="0"/>
-              <a:t>24.04.2021</a:t>
+              <a:t>27.04.2021</a:t>
             </a:fld>
             <a:endParaRPr lang="ru-RU"/>
           </a:p>
@@ -2676,7 +2676,7 @@
           <a:p>
             <a:fld id="{379314A1-82A5-4FD9-96C3-56E3E0F9E470}" type="datetimeFigureOut">
               <a:rPr lang="ru-RU" smtClean="0"/>
-              <a:t>24.04.2021</a:t>
+              <a:t>27.04.2021</a:t>
             </a:fld>
             <a:endParaRPr lang="ru-RU"/>
           </a:p>
@@ -2917,7 +2917,7 @@
           <a:p>
             <a:fld id="{379314A1-82A5-4FD9-96C3-56E3E0F9E470}" type="datetimeFigureOut">
               <a:rPr lang="ru-RU" smtClean="0"/>
-              <a:t>24.04.2021</a:t>
+              <a:t>27.04.2021</a:t>
             </a:fld>
             <a:endParaRPr lang="ru-RU"/>
           </a:p>
@@ -7152,6 +7152,9 @@
                     <p:cTn id="3" fill="hold">
                       <p:stCondLst>
                         <p:cond delay="indefinite"/>
+                        <p:cond evt="onBegin" delay="0">
+                          <p:tn val="2"/>
+                        </p:cond>
                       </p:stCondLst>
                       <p:childTnLst>
                         <p:par>
@@ -7161,7 +7164,7 @@
                             </p:stCondLst>
                             <p:childTnLst>
                               <p:par>
-                                <p:cTn id="5" presetID="10" presetClass="entr" presetSubtype="0" fill="hold" nodeType="clickEffect">
+                                <p:cTn id="5" presetID="10" presetClass="entr" presetSubtype="0" fill="hold" nodeType="withEffect">
                                   <p:stCondLst>
                                     <p:cond delay="0"/>
                                   </p:stCondLst>
@@ -7169,6 +7172,59 @@
                                     <p:set>
                                       <p:cBhvr>
                                         <p:cTn id="6" dur="1" fill="hold">
+                                          <p:stCondLst>
+                                            <p:cond delay="0"/>
+                                          </p:stCondLst>
+                                        </p:cTn>
+                                        <p:tgtEl>
+                                          <p:spTgt spid="19"/>
+                                        </p:tgtEl>
+                                        <p:attrNameLst>
+                                          <p:attrName>style.visibility</p:attrName>
+                                        </p:attrNameLst>
+                                      </p:cBhvr>
+                                      <p:to>
+                                        <p:strVal val="visible"/>
+                                      </p:to>
+                                    </p:set>
+                                    <p:animEffect transition="in" filter="fade">
+                                      <p:cBhvr>
+                                        <p:cTn id="7" dur="500"/>
+                                        <p:tgtEl>
+                                          <p:spTgt spid="19"/>
+                                        </p:tgtEl>
+                                      </p:cBhvr>
+                                    </p:animEffect>
+                                  </p:childTnLst>
+                                </p:cTn>
+                              </p:par>
+                            </p:childTnLst>
+                          </p:cTn>
+                        </p:par>
+                      </p:childTnLst>
+                    </p:cTn>
+                  </p:par>
+                  <p:par>
+                    <p:cTn id="8" fill="hold">
+                      <p:stCondLst>
+                        <p:cond delay="indefinite"/>
+                      </p:stCondLst>
+                      <p:childTnLst>
+                        <p:par>
+                          <p:cTn id="9" fill="hold">
+                            <p:stCondLst>
+                              <p:cond delay="0"/>
+                            </p:stCondLst>
+                            <p:childTnLst>
+                              <p:par>
+                                <p:cTn id="10" presetID="10" presetClass="entr" presetSubtype="0" fill="hold" nodeType="clickEffect">
+                                  <p:stCondLst>
+                                    <p:cond delay="0"/>
+                                  </p:stCondLst>
+                                  <p:childTnLst>
+                                    <p:set>
+                                      <p:cBhvr>
+                                        <p:cTn id="11" dur="1" fill="hold">
                                           <p:stCondLst>
                                             <p:cond delay="0"/>
                                           </p:stCondLst>
@@ -7186,7 +7242,7 @@
                                     </p:set>
                                     <p:animEffect transition="in" filter="fade">
                                       <p:cBhvr>
-                                        <p:cTn id="7" dur="500"/>
+                                        <p:cTn id="12" dur="500"/>
                                         <p:tgtEl>
                                           <p:spTgt spid="25"/>
                                         </p:tgtEl>
@@ -7196,14 +7252,14 @@
                                 </p:cTn>
                               </p:par>
                               <p:par>
-                                <p:cTn id="8" presetID="10" presetClass="entr" presetSubtype="0" fill="hold" nodeType="withEffect">
+                                <p:cTn id="13" presetID="10" presetClass="entr" presetSubtype="0" fill="hold" nodeType="withEffect">
                                   <p:stCondLst>
                                     <p:cond delay="0"/>
                                   </p:stCondLst>
                                   <p:childTnLst>
                                     <p:set>
                                       <p:cBhvr>
-                                        <p:cTn id="9" dur="1" fill="hold">
+                                        <p:cTn id="14" dur="1" fill="hold">
                                           <p:stCondLst>
                                             <p:cond delay="0"/>
                                           </p:stCondLst>
@@ -7221,7 +7277,7 @@
                                     </p:set>
                                     <p:animEffect transition="in" filter="fade">
                                       <p:cBhvr>
-                                        <p:cTn id="10" dur="500"/>
+                                        <p:cTn id="15" dur="500"/>
                                         <p:tgtEl>
                                           <p:spTgt spid="17"/>
                                         </p:tgtEl>
@@ -7237,26 +7293,26 @@
                     </p:cTn>
                   </p:par>
                   <p:par>
-                    <p:cTn id="11" fill="hold">
+                    <p:cTn id="16" fill="hold">
                       <p:stCondLst>
                         <p:cond delay="indefinite"/>
                       </p:stCondLst>
                       <p:childTnLst>
                         <p:par>
-                          <p:cTn id="12" fill="hold">
+                          <p:cTn id="17" fill="hold">
                             <p:stCondLst>
                               <p:cond delay="0"/>
                             </p:stCondLst>
                             <p:childTnLst>
                               <p:par>
-                                <p:cTn id="13" presetID="10" presetClass="entr" presetSubtype="0" fill="hold" nodeType="clickEffect">
+                                <p:cTn id="18" presetID="10" presetClass="entr" presetSubtype="0" fill="hold" nodeType="clickEffect">
                                   <p:stCondLst>
                                     <p:cond delay="0"/>
                                   </p:stCondLst>
                                   <p:childTnLst>
                                     <p:set>
                                       <p:cBhvr>
-                                        <p:cTn id="14" dur="1" fill="hold">
+                                        <p:cTn id="19" dur="1" fill="hold">
                                           <p:stCondLst>
                                             <p:cond delay="0"/>
                                           </p:stCondLst>
@@ -7274,7 +7330,7 @@
                                     </p:set>
                                     <p:animEffect transition="in" filter="fade">
                                       <p:cBhvr>
-                                        <p:cTn id="15" dur="500"/>
+                                        <p:cTn id="20" dur="500"/>
                                         <p:tgtEl>
                                           <p:spTgt spid="36"/>
                                         </p:tgtEl>
@@ -7284,14 +7340,14 @@
                                 </p:cTn>
                               </p:par>
                               <p:par>
-                                <p:cTn id="16" presetID="10" presetClass="entr" presetSubtype="0" fill="hold" nodeType="withEffect">
+                                <p:cTn id="21" presetID="10" presetClass="entr" presetSubtype="0" fill="hold" nodeType="withEffect">
                                   <p:stCondLst>
                                     <p:cond delay="0"/>
                                   </p:stCondLst>
                                   <p:childTnLst>
                                     <p:set>
                                       <p:cBhvr>
-                                        <p:cTn id="17" dur="1" fill="hold">
+                                        <p:cTn id="22" dur="1" fill="hold">
                                           <p:stCondLst>
                                             <p:cond delay="0"/>
                                           </p:stCondLst>
@@ -7309,7 +7365,7 @@
                                     </p:set>
                                     <p:animEffect transition="in" filter="fade">
                                       <p:cBhvr>
-                                        <p:cTn id="18" dur="500"/>
+                                        <p:cTn id="23" dur="500"/>
                                         <p:tgtEl>
                                           <p:spTgt spid="29"/>
                                         </p:tgtEl>
@@ -7631,9 +7687,7 @@
             <a:prstGeom prst="rect">
               <a:avLst/>
             </a:prstGeom>
-            <a:solidFill>
-              <a:srgbClr val="6B8FCF"/>
-            </a:solidFill>
+            <a:noFill/>
           </p:spPr>
           <p:style>
             <a:lnRef idx="0">
@@ -8551,9 +8605,7 @@
             <a:prstGeom prst="rect">
               <a:avLst/>
             </a:prstGeom>
-            <a:solidFill>
-              <a:srgbClr val="6B8FCF"/>
-            </a:solidFill>
+            <a:noFill/>
           </p:spPr>
           <p:style>
             <a:lnRef idx="0">
@@ -8718,9 +8770,7 @@
             <a:prstGeom prst="rect">
               <a:avLst/>
             </a:prstGeom>
-            <a:solidFill>
-              <a:srgbClr val="6B8FCF"/>
-            </a:solidFill>
+            <a:noFill/>
           </p:spPr>
           <p:style>
             <a:lnRef idx="0">
@@ -9460,7 +9510,7 @@
         </p:blipFill>
         <p:spPr>
           <a:xfrm>
-            <a:off x="2378279" y="1341209"/>
+            <a:off x="2376157" y="1320049"/>
             <a:ext cx="7435442" cy="5320445"/>
           </a:xfrm>
           <a:prstGeom prst="rect">
@@ -9470,10 +9520,10 @@
       </p:pic>
       <p:pic>
         <p:nvPicPr>
-          <p:cNvPr id="16" name="Рисунок 15">
+          <p:cNvPr id="5" name="Рисунок 4">
             <a:extLst>
               <a:ext uri="{FF2B5EF4-FFF2-40B4-BE49-F238E27FC236}">
-                <a16:creationId xmlns:a16="http://schemas.microsoft.com/office/drawing/2014/main" id="{D96252B0-28D7-4CFF-B995-4A8BF8EEA8B5}"/>
+                <a16:creationId xmlns:a16="http://schemas.microsoft.com/office/drawing/2014/main" id="{B3D6EA41-05AD-450A-BC05-3D1C78B38F5F}"/>
               </a:ext>
             </a:extLst>
           </p:cNvPr>
@@ -9490,8 +9540,8 @@
         </p:blipFill>
         <p:spPr>
           <a:xfrm>
-            <a:off x="2261344" y="1204798"/>
-            <a:ext cx="7665067" cy="5515636"/>
+            <a:off x="1994537" y="1211642"/>
+            <a:ext cx="8198682" cy="5511073"/>
           </a:xfrm>
           <a:prstGeom prst="rect">
             <a:avLst/>
@@ -9520,6 +9570,9 @@
                     <p:cTn id="3" fill="hold">
                       <p:stCondLst>
                         <p:cond delay="indefinite"/>
+                        <p:cond evt="onBegin" delay="0">
+                          <p:tn val="2"/>
+                        </p:cond>
                       </p:stCondLst>
                       <p:childTnLst>
                         <p:par>
@@ -9529,7 +9582,7 @@
                             </p:stCondLst>
                             <p:childTnLst>
                               <p:par>
-                                <p:cTn id="5" presetID="10" presetClass="entr" presetSubtype="0" fill="hold" nodeType="clickEffect">
+                                <p:cTn id="5" presetID="10" presetClass="entr" presetSubtype="0" fill="hold" nodeType="withEffect">
                                   <p:stCondLst>
                                     <p:cond delay="0"/>
                                   </p:stCondLst>
@@ -9542,7 +9595,7 @@
                                           </p:stCondLst>
                                         </p:cTn>
                                         <p:tgtEl>
-                                          <p:spTgt spid="9"/>
+                                          <p:spTgt spid="6"/>
                                         </p:tgtEl>
                                         <p:attrNameLst>
                                           <p:attrName>style.visibility</p:attrName>
@@ -9556,7 +9609,7 @@
                                       <p:cBhvr>
                                         <p:cTn id="7" dur="500"/>
                                         <p:tgtEl>
-                                          <p:spTgt spid="9"/>
+                                          <p:spTgt spid="6"/>
                                         </p:tgtEl>
                                       </p:cBhvr>
                                     </p:animEffect>
@@ -9595,7 +9648,7 @@
                                           </p:stCondLst>
                                         </p:cTn>
                                         <p:tgtEl>
-                                          <p:spTgt spid="16"/>
+                                          <p:spTgt spid="9"/>
                                         </p:tgtEl>
                                         <p:attrNameLst>
                                           <p:attrName>style.visibility</p:attrName>
@@ -9609,7 +9662,60 @@
                                       <p:cBhvr>
                                         <p:cTn id="12" dur="500"/>
                                         <p:tgtEl>
-                                          <p:spTgt spid="16"/>
+                                          <p:spTgt spid="9"/>
+                                        </p:tgtEl>
+                                      </p:cBhvr>
+                                    </p:animEffect>
+                                  </p:childTnLst>
+                                </p:cTn>
+                              </p:par>
+                            </p:childTnLst>
+                          </p:cTn>
+                        </p:par>
+                      </p:childTnLst>
+                    </p:cTn>
+                  </p:par>
+                  <p:par>
+                    <p:cTn id="13" fill="hold">
+                      <p:stCondLst>
+                        <p:cond delay="indefinite"/>
+                      </p:stCondLst>
+                      <p:childTnLst>
+                        <p:par>
+                          <p:cTn id="14" fill="hold">
+                            <p:stCondLst>
+                              <p:cond delay="0"/>
+                            </p:stCondLst>
+                            <p:childTnLst>
+                              <p:par>
+                                <p:cTn id="15" presetID="10" presetClass="entr" presetSubtype="0" fill="hold" nodeType="clickEffect">
+                                  <p:stCondLst>
+                                    <p:cond delay="0"/>
+                                  </p:stCondLst>
+                                  <p:childTnLst>
+                                    <p:set>
+                                      <p:cBhvr>
+                                        <p:cTn id="16" dur="1" fill="hold">
+                                          <p:stCondLst>
+                                            <p:cond delay="0"/>
+                                          </p:stCondLst>
+                                        </p:cTn>
+                                        <p:tgtEl>
+                                          <p:spTgt spid="5"/>
+                                        </p:tgtEl>
+                                        <p:attrNameLst>
+                                          <p:attrName>style.visibility</p:attrName>
+                                        </p:attrNameLst>
+                                      </p:cBhvr>
+                                      <p:to>
+                                        <p:strVal val="visible"/>
+                                      </p:to>
+                                    </p:set>
+                                    <p:animEffect transition="in" filter="fade">
+                                      <p:cBhvr>
+                                        <p:cTn id="17" dur="500"/>
+                                        <p:tgtEl>
+                                          <p:spTgt spid="5"/>
                                         </p:tgtEl>
                                       </p:cBhvr>
                                     </p:animEffect>
@@ -9865,9 +9971,7 @@
             <a:prstGeom prst="rect">
               <a:avLst/>
             </a:prstGeom>
-            <a:solidFill>
-              <a:srgbClr val="6B8FCF"/>
-            </a:solidFill>
+            <a:noFill/>
           </p:spPr>
           <p:style>
             <a:lnRef idx="0">
@@ -10046,9 +10150,7 @@
             <a:prstGeom prst="rect">
               <a:avLst/>
             </a:prstGeom>
-            <a:solidFill>
-              <a:srgbClr val="6B8FCF"/>
-            </a:solidFill>
+            <a:noFill/>
           </p:spPr>
           <p:style>
             <a:lnRef idx="0">
@@ -10639,9 +10741,7 @@
             <a:prstGeom prst="rect">
               <a:avLst/>
             </a:prstGeom>
-            <a:solidFill>
-              <a:srgbClr val="6B8FCF"/>
-            </a:solidFill>
+            <a:noFill/>
           </p:spPr>
           <p:style>
             <a:lnRef idx="0">
@@ -10834,9 +10934,7 @@
             <a:prstGeom prst="rect">
               <a:avLst/>
             </a:prstGeom>
-            <a:solidFill>
-              <a:srgbClr val="6B8FCF"/>
-            </a:solidFill>
+            <a:noFill/>
           </p:spPr>
           <p:style>
             <a:lnRef idx="0">
@@ -11029,9 +11127,7 @@
             <a:prstGeom prst="rect">
               <a:avLst/>
             </a:prstGeom>
-            <a:solidFill>
-              <a:srgbClr val="6B8FCF"/>
-            </a:solidFill>
+            <a:noFill/>
           </p:spPr>
           <p:style>
             <a:lnRef idx="0">
@@ -11218,6 +11314,337 @@
   <p:clrMapOvr>
     <a:masterClrMapping/>
   </p:clrMapOvr>
+  <p:timing>
+    <p:tnLst>
+      <p:par>
+        <p:cTn id="1" dur="indefinite" restart="never" nodeType="tmRoot">
+          <p:childTnLst>
+            <p:seq concurrent="1" nextAc="seek">
+              <p:cTn id="2" dur="indefinite" nodeType="mainSeq">
+                <p:childTnLst>
+                  <p:par>
+                    <p:cTn id="3" fill="hold">
+                      <p:stCondLst>
+                        <p:cond delay="indefinite"/>
+                        <p:cond evt="onBegin" delay="0">
+                          <p:tn val="2"/>
+                        </p:cond>
+                      </p:stCondLst>
+                      <p:childTnLst>
+                        <p:par>
+                          <p:cTn id="4" fill="hold">
+                            <p:stCondLst>
+                              <p:cond delay="0"/>
+                            </p:stCondLst>
+                            <p:childTnLst>
+                              <p:par>
+                                <p:cTn id="5" presetID="10" presetClass="entr" presetSubtype="0" fill="hold" nodeType="withEffect">
+                                  <p:stCondLst>
+                                    <p:cond delay="0"/>
+                                  </p:stCondLst>
+                                  <p:childTnLst>
+                                    <p:set>
+                                      <p:cBhvr>
+                                        <p:cTn id="6" dur="1" fill="hold">
+                                          <p:stCondLst>
+                                            <p:cond delay="0"/>
+                                          </p:stCondLst>
+                                        </p:cTn>
+                                        <p:tgtEl>
+                                          <p:spTgt spid="4"/>
+                                        </p:tgtEl>
+                                        <p:attrNameLst>
+                                          <p:attrName>style.visibility</p:attrName>
+                                        </p:attrNameLst>
+                                      </p:cBhvr>
+                                      <p:to>
+                                        <p:strVal val="visible"/>
+                                      </p:to>
+                                    </p:set>
+                                    <p:animEffect transition="in" filter="fade">
+                                      <p:cBhvr>
+                                        <p:cTn id="7" dur="500"/>
+                                        <p:tgtEl>
+                                          <p:spTgt spid="4"/>
+                                        </p:tgtEl>
+                                      </p:cBhvr>
+                                    </p:animEffect>
+                                  </p:childTnLst>
+                                </p:cTn>
+                              </p:par>
+                              <p:par>
+                                <p:cTn id="8" presetID="10" presetClass="entr" presetSubtype="0" fill="hold" nodeType="withEffect">
+                                  <p:stCondLst>
+                                    <p:cond delay="0"/>
+                                  </p:stCondLst>
+                                  <p:childTnLst>
+                                    <p:set>
+                                      <p:cBhvr>
+                                        <p:cTn id="9" dur="1" fill="hold">
+                                          <p:stCondLst>
+                                            <p:cond delay="0"/>
+                                          </p:stCondLst>
+                                        </p:cTn>
+                                        <p:tgtEl>
+                                          <p:spTgt spid="23"/>
+                                        </p:tgtEl>
+                                        <p:attrNameLst>
+                                          <p:attrName>style.visibility</p:attrName>
+                                        </p:attrNameLst>
+                                      </p:cBhvr>
+                                      <p:to>
+                                        <p:strVal val="visible"/>
+                                      </p:to>
+                                    </p:set>
+                                    <p:animEffect transition="in" filter="fade">
+                                      <p:cBhvr>
+                                        <p:cTn id="10" dur="500"/>
+                                        <p:tgtEl>
+                                          <p:spTgt spid="23"/>
+                                        </p:tgtEl>
+                                      </p:cBhvr>
+                                    </p:animEffect>
+                                  </p:childTnLst>
+                                </p:cTn>
+                              </p:par>
+                              <p:par>
+                                <p:cTn id="11" presetID="10" presetClass="entr" presetSubtype="0" fill="hold" nodeType="withEffect">
+                                  <p:stCondLst>
+                                    <p:cond delay="0"/>
+                                  </p:stCondLst>
+                                  <p:childTnLst>
+                                    <p:set>
+                                      <p:cBhvr>
+                                        <p:cTn id="12" dur="1" fill="hold">
+                                          <p:stCondLst>
+                                            <p:cond delay="0"/>
+                                          </p:stCondLst>
+                                        </p:cTn>
+                                        <p:tgtEl>
+                                          <p:spTgt spid="6"/>
+                                        </p:tgtEl>
+                                        <p:attrNameLst>
+                                          <p:attrName>style.visibility</p:attrName>
+                                        </p:attrNameLst>
+                                      </p:cBhvr>
+                                      <p:to>
+                                        <p:strVal val="visible"/>
+                                      </p:to>
+                                    </p:set>
+                                    <p:animEffect transition="in" filter="fade">
+                                      <p:cBhvr>
+                                        <p:cTn id="13" dur="500"/>
+                                        <p:tgtEl>
+                                          <p:spTgt spid="6"/>
+                                        </p:tgtEl>
+                                      </p:cBhvr>
+                                    </p:animEffect>
+                                  </p:childTnLst>
+                                </p:cTn>
+                              </p:par>
+                              <p:par>
+                                <p:cTn id="14" presetID="10" presetClass="entr" presetSubtype="0" fill="hold" nodeType="withEffect">
+                                  <p:stCondLst>
+                                    <p:cond delay="0"/>
+                                  </p:stCondLst>
+                                  <p:childTnLst>
+                                    <p:set>
+                                      <p:cBhvr>
+                                        <p:cTn id="15" dur="1" fill="hold">
+                                          <p:stCondLst>
+                                            <p:cond delay="0"/>
+                                          </p:stCondLst>
+                                        </p:cTn>
+                                        <p:tgtEl>
+                                          <p:spTgt spid="32"/>
+                                        </p:tgtEl>
+                                        <p:attrNameLst>
+                                          <p:attrName>style.visibility</p:attrName>
+                                        </p:attrNameLst>
+                                      </p:cBhvr>
+                                      <p:to>
+                                        <p:strVal val="visible"/>
+                                      </p:to>
+                                    </p:set>
+                                    <p:animEffect transition="in" filter="fade">
+                                      <p:cBhvr>
+                                        <p:cTn id="16" dur="500"/>
+                                        <p:tgtEl>
+                                          <p:spTgt spid="32"/>
+                                        </p:tgtEl>
+                                      </p:cBhvr>
+                                    </p:animEffect>
+                                  </p:childTnLst>
+                                </p:cTn>
+                              </p:par>
+                              <p:par>
+                                <p:cTn id="17" presetID="10" presetClass="entr" presetSubtype="0" fill="hold" nodeType="withEffect">
+                                  <p:stCondLst>
+                                    <p:cond delay="0"/>
+                                  </p:stCondLst>
+                                  <p:childTnLst>
+                                    <p:set>
+                                      <p:cBhvr>
+                                        <p:cTn id="18" dur="1" fill="hold">
+                                          <p:stCondLst>
+                                            <p:cond delay="0"/>
+                                          </p:stCondLst>
+                                        </p:cTn>
+                                        <p:tgtEl>
+                                          <p:spTgt spid="42"/>
+                                        </p:tgtEl>
+                                        <p:attrNameLst>
+                                          <p:attrName>style.visibility</p:attrName>
+                                        </p:attrNameLst>
+                                      </p:cBhvr>
+                                      <p:to>
+                                        <p:strVal val="visible"/>
+                                      </p:to>
+                                    </p:set>
+                                    <p:animEffect transition="in" filter="fade">
+                                      <p:cBhvr>
+                                        <p:cTn id="19" dur="500"/>
+                                        <p:tgtEl>
+                                          <p:spTgt spid="42"/>
+                                        </p:tgtEl>
+                                      </p:cBhvr>
+                                    </p:animEffect>
+                                  </p:childTnLst>
+                                </p:cTn>
+                              </p:par>
+                              <p:par>
+                                <p:cTn id="20" presetID="10" presetClass="entr" presetSubtype="0" fill="hold" nodeType="withEffect">
+                                  <p:stCondLst>
+                                    <p:cond delay="0"/>
+                                  </p:stCondLst>
+                                  <p:childTnLst>
+                                    <p:set>
+                                      <p:cBhvr>
+                                        <p:cTn id="21" dur="1" fill="hold">
+                                          <p:stCondLst>
+                                            <p:cond delay="0"/>
+                                          </p:stCondLst>
+                                        </p:cTn>
+                                        <p:tgtEl>
+                                          <p:spTgt spid="35"/>
+                                        </p:tgtEl>
+                                        <p:attrNameLst>
+                                          <p:attrName>style.visibility</p:attrName>
+                                        </p:attrNameLst>
+                                      </p:cBhvr>
+                                      <p:to>
+                                        <p:strVal val="visible"/>
+                                      </p:to>
+                                    </p:set>
+                                    <p:animEffect transition="in" filter="fade">
+                                      <p:cBhvr>
+                                        <p:cTn id="22" dur="500"/>
+                                        <p:tgtEl>
+                                          <p:spTgt spid="35"/>
+                                        </p:tgtEl>
+                                      </p:cBhvr>
+                                    </p:animEffect>
+                                  </p:childTnLst>
+                                </p:cTn>
+                              </p:par>
+                              <p:par>
+                                <p:cTn id="23" presetID="10" presetClass="entr" presetSubtype="0" fill="hold" nodeType="withEffect">
+                                  <p:stCondLst>
+                                    <p:cond delay="0"/>
+                                  </p:stCondLst>
+                                  <p:childTnLst>
+                                    <p:set>
+                                      <p:cBhvr>
+                                        <p:cTn id="24" dur="1" fill="hold">
+                                          <p:stCondLst>
+                                            <p:cond delay="0"/>
+                                          </p:stCondLst>
+                                        </p:cTn>
+                                        <p:tgtEl>
+                                          <p:spTgt spid="44"/>
+                                        </p:tgtEl>
+                                        <p:attrNameLst>
+                                          <p:attrName>style.visibility</p:attrName>
+                                        </p:attrNameLst>
+                                      </p:cBhvr>
+                                      <p:to>
+                                        <p:strVal val="visible"/>
+                                      </p:to>
+                                    </p:set>
+                                    <p:animEffect transition="in" filter="fade">
+                                      <p:cBhvr>
+                                        <p:cTn id="25" dur="500"/>
+                                        <p:tgtEl>
+                                          <p:spTgt spid="44"/>
+                                        </p:tgtEl>
+                                      </p:cBhvr>
+                                    </p:animEffect>
+                                  </p:childTnLst>
+                                </p:cTn>
+                              </p:par>
+                              <p:par>
+                                <p:cTn id="26" presetID="10" presetClass="entr" presetSubtype="0" fill="hold" nodeType="withEffect">
+                                  <p:stCondLst>
+                                    <p:cond delay="0"/>
+                                  </p:stCondLst>
+                                  <p:childTnLst>
+                                    <p:set>
+                                      <p:cBhvr>
+                                        <p:cTn id="27" dur="1" fill="hold">
+                                          <p:stCondLst>
+                                            <p:cond delay="0"/>
+                                          </p:stCondLst>
+                                        </p:cTn>
+                                        <p:tgtEl>
+                                          <p:spTgt spid="38"/>
+                                        </p:tgtEl>
+                                        <p:attrNameLst>
+                                          <p:attrName>style.visibility</p:attrName>
+                                        </p:attrNameLst>
+                                      </p:cBhvr>
+                                      <p:to>
+                                        <p:strVal val="visible"/>
+                                      </p:to>
+                                    </p:set>
+                                    <p:animEffect transition="in" filter="fade">
+                                      <p:cBhvr>
+                                        <p:cTn id="28" dur="500"/>
+                                        <p:tgtEl>
+                                          <p:spTgt spid="38"/>
+                                        </p:tgtEl>
+                                      </p:cBhvr>
+                                    </p:animEffect>
+                                  </p:childTnLst>
+                                </p:cTn>
+                              </p:par>
+                            </p:childTnLst>
+                          </p:cTn>
+                        </p:par>
+                      </p:childTnLst>
+                    </p:cTn>
+                  </p:par>
+                </p:childTnLst>
+              </p:cTn>
+              <p:prevCondLst>
+                <p:cond evt="onPrev" delay="0">
+                  <p:tgtEl>
+                    <p:sldTgt/>
+                  </p:tgtEl>
+                </p:cond>
+              </p:prevCondLst>
+              <p:nextCondLst>
+                <p:cond evt="onNext" delay="0">
+                  <p:tgtEl>
+                    <p:sldTgt/>
+                  </p:tgtEl>
+                </p:cond>
+              </p:nextCondLst>
+            </p:seq>
+          </p:childTnLst>
+        </p:cTn>
+      </p:par>
+    </p:tnLst>
+  </p:timing>
 </p:sld>
 </file>
 

</xml_diff>